<commit_message>
Final Presentation and Paper Moved from OneDrive to Git
</commit_message>
<xml_diff>
--- a/Presentation/MSDS6372_Project2_Presentation.pptx
+++ b/Presentation/MSDS6372_Project2_Presentation.pptx
@@ -196,9 +196,7 @@
 <file path=ppt/revisionInfo.xml><?xml version="1.0" encoding="utf-8"?>
 <p1510:revInfo xmlns:a="http://schemas.openxmlformats.org/drawingml/2006/main" xmlns:r="http://schemas.openxmlformats.org/officeDocument/2006/relationships" xmlns:p1510="http://schemas.microsoft.com/office/powerpoint/2015/10/main">
   <p1510:revLst>
-    <p1510:client id="{0CC6D829-E0AE-4FA6-8314-5F4DCCE3D807}" v="1569" dt="2019-04-09T01:16:46.023"/>
-    <p1510:client id="{11A5286B-93D7-47F3-8512-9AC468B2E9D1}" v="38" dt="2019-04-09T00:19:36.071"/>
-    <p1510:client id="{99EB3D62-25D8-4153-9605-BCEF90CCAAF4}" v="158" dt="2019-04-09T00:58:57.314"/>
+    <p1510:client id="{0CC6D829-E0AE-4FA6-8314-5F4DCCE3D807}" v="2186" dt="2019-04-12T12:48:39.081"/>
   </p1510:revLst>
 </p1510:revInfo>
 </file>
@@ -208,10 +206,25 @@
   <pc:docChgLst>
     <pc:chgData name="Nikhil Gupta" userId="7ec69372-1d6c-41bc-a393-621db78cf6a5" providerId="ADAL" clId="{0CC6D829-E0AE-4FA6-8314-5F4DCCE3D807}"/>
     <pc:docChg chg="undo custSel addSld modSld">
-      <pc:chgData name="Nikhil Gupta" userId="7ec69372-1d6c-41bc-a393-621db78cf6a5" providerId="ADAL" clId="{0CC6D829-E0AE-4FA6-8314-5F4DCCE3D807}" dt="2019-04-09T01:16:46.023" v="1567" actId="1035"/>
+      <pc:chgData name="Nikhil Gupta" userId="7ec69372-1d6c-41bc-a393-621db78cf6a5" providerId="ADAL" clId="{0CC6D829-E0AE-4FA6-8314-5F4DCCE3D807}" dt="2019-04-12T12:48:39.081" v="1573" actId="20577"/>
       <pc:docMkLst>
         <pc:docMk/>
       </pc:docMkLst>
+      <pc:sldChg chg="modSp">
+        <pc:chgData name="Nikhil Gupta" userId="7ec69372-1d6c-41bc-a393-621db78cf6a5" providerId="ADAL" clId="{0CC6D829-E0AE-4FA6-8314-5F4DCCE3D807}" dt="2019-04-12T12:48:39.081" v="1573" actId="20577"/>
+        <pc:sldMkLst>
+          <pc:docMk/>
+          <pc:sldMk cId="291346663" sldId="256"/>
+        </pc:sldMkLst>
+        <pc:spChg chg="mod">
+          <ac:chgData name="Nikhil Gupta" userId="7ec69372-1d6c-41bc-a393-621db78cf6a5" providerId="ADAL" clId="{0CC6D829-E0AE-4FA6-8314-5F4DCCE3D807}" dt="2019-04-12T12:48:39.081" v="1573" actId="20577"/>
+          <ac:spMkLst>
+            <pc:docMk/>
+            <pc:sldMk cId="291346663" sldId="256"/>
+            <ac:spMk id="5" creationId="{00000000-0000-0000-0000-000000000000}"/>
+          </ac:spMkLst>
+        </pc:spChg>
+      </pc:sldChg>
       <pc:sldChg chg="modSp">
         <pc:chgData name="Nikhil Gupta" userId="7ec69372-1d6c-41bc-a393-621db78cf6a5" providerId="ADAL" clId="{0CC6D829-E0AE-4FA6-8314-5F4DCCE3D807}" dt="2019-04-09T01:12:10.902" v="1538" actId="27636"/>
         <pc:sldMkLst>
@@ -1032,6 +1045,217 @@
             <ac:graphicFrameMk id="9" creationId="{618D28A7-0AC4-4A42-904F-2EAAC40A8F89}"/>
           </ac:graphicFrameMkLst>
         </pc:graphicFrameChg>
+      </pc:sldChg>
+    </pc:docChg>
+  </pc:docChgLst>
+  <pc:docChgLst>
+    <pc:chgData name="Gupta, Nikhil" userId="7ec69372-1d6c-41bc-a393-621db78cf6a5" providerId="ADAL" clId="{0CC6D829-E0AE-4FA6-8314-5F4DCCE3D807}"/>
+    <pc:docChg chg="undo custSel modSld">
+      <pc:chgData name="Gupta, Nikhil" userId="7ec69372-1d6c-41bc-a393-621db78cf6a5" providerId="ADAL" clId="{0CC6D829-E0AE-4FA6-8314-5F4DCCE3D807}" dt="2019-04-11T02:38:44.701" v="610" actId="20577"/>
+      <pc:docMkLst>
+        <pc:docMk/>
+      </pc:docMkLst>
+      <pc:sldChg chg="addSp modSp">
+        <pc:chgData name="Gupta, Nikhil" userId="7ec69372-1d6c-41bc-a393-621db78cf6a5" providerId="ADAL" clId="{0CC6D829-E0AE-4FA6-8314-5F4DCCE3D807}" dt="2019-04-11T02:38:44.701" v="610" actId="20577"/>
+        <pc:sldMkLst>
+          <pc:docMk/>
+          <pc:sldMk cId="1619184741" sldId="287"/>
+        </pc:sldMkLst>
+        <pc:spChg chg="mod">
+          <ac:chgData name="Gupta, Nikhil" userId="7ec69372-1d6c-41bc-a393-621db78cf6a5" providerId="ADAL" clId="{0CC6D829-E0AE-4FA6-8314-5F4DCCE3D807}" dt="2019-04-11T02:13:46.085" v="243" actId="1036"/>
+          <ac:spMkLst>
+            <pc:docMk/>
+            <pc:sldMk cId="1619184741" sldId="287"/>
+            <ac:spMk id="5" creationId="{765D4098-25EE-465B-BAB1-05D5F24401B7}"/>
+          </ac:spMkLst>
+        </pc:spChg>
+        <pc:spChg chg="mod">
+          <ac:chgData name="Gupta, Nikhil" userId="7ec69372-1d6c-41bc-a393-621db78cf6a5" providerId="ADAL" clId="{0CC6D829-E0AE-4FA6-8314-5F4DCCE3D807}" dt="2019-04-11T02:38:44.701" v="610" actId="20577"/>
+          <ac:spMkLst>
+            <pc:docMk/>
+            <pc:sldMk cId="1619184741" sldId="287"/>
+            <ac:spMk id="6" creationId="{0D94CC2B-E539-490F-93A5-CC73E55B3C60}"/>
+          </ac:spMkLst>
+        </pc:spChg>
+        <pc:spChg chg="mod">
+          <ac:chgData name="Gupta, Nikhil" userId="7ec69372-1d6c-41bc-a393-621db78cf6a5" providerId="ADAL" clId="{0CC6D829-E0AE-4FA6-8314-5F4DCCE3D807}" dt="2019-04-11T02:13:46.085" v="243" actId="1036"/>
+          <ac:spMkLst>
+            <pc:docMk/>
+            <pc:sldMk cId="1619184741" sldId="287"/>
+            <ac:spMk id="7" creationId="{DC231AC0-5113-4AE8-A804-56B5B7915CE0}"/>
+          </ac:spMkLst>
+        </pc:spChg>
+        <pc:picChg chg="add mod">
+          <ac:chgData name="Gupta, Nikhil" userId="7ec69372-1d6c-41bc-a393-621db78cf6a5" providerId="ADAL" clId="{0CC6D829-E0AE-4FA6-8314-5F4DCCE3D807}" dt="2019-04-11T02:14:50.845" v="309" actId="14100"/>
+          <ac:picMkLst>
+            <pc:docMk/>
+            <pc:sldMk cId="1619184741" sldId="287"/>
+            <ac:picMk id="8" creationId="{B9A76E54-9A65-4E10-B07F-B4F138E02C9C}"/>
+          </ac:picMkLst>
+        </pc:picChg>
+        <pc:picChg chg="add mod">
+          <ac:chgData name="Gupta, Nikhil" userId="7ec69372-1d6c-41bc-a393-621db78cf6a5" providerId="ADAL" clId="{0CC6D829-E0AE-4FA6-8314-5F4DCCE3D807}" dt="2019-04-11T02:14:47.260" v="307" actId="14100"/>
+          <ac:picMkLst>
+            <pc:docMk/>
+            <pc:sldMk cId="1619184741" sldId="287"/>
+            <ac:picMk id="9" creationId="{AB2B7E26-B6F2-420C-8127-C0673954A42F}"/>
+          </ac:picMkLst>
+        </pc:picChg>
+      </pc:sldChg>
+      <pc:sldChg chg="addSp modSp">
+        <pc:chgData name="Gupta, Nikhil" userId="7ec69372-1d6c-41bc-a393-621db78cf6a5" providerId="ADAL" clId="{0CC6D829-E0AE-4FA6-8314-5F4DCCE3D807}" dt="2019-04-11T02:15:15.325" v="314" actId="1076"/>
+        <pc:sldMkLst>
+          <pc:docMk/>
+          <pc:sldMk cId="3323114340" sldId="288"/>
+        </pc:sldMkLst>
+        <pc:spChg chg="mod">
+          <ac:chgData name="Gupta, Nikhil" userId="7ec69372-1d6c-41bc-a393-621db78cf6a5" providerId="ADAL" clId="{0CC6D829-E0AE-4FA6-8314-5F4DCCE3D807}" dt="2019-04-11T02:11:04.964" v="177" actId="14100"/>
+          <ac:spMkLst>
+            <pc:docMk/>
+            <pc:sldMk cId="3323114340" sldId="288"/>
+            <ac:spMk id="2" creationId="{442FC6F0-4472-4729-AF02-5029F58FEAFA}"/>
+          </ac:spMkLst>
+        </pc:spChg>
+        <pc:spChg chg="mod">
+          <ac:chgData name="Gupta, Nikhil" userId="7ec69372-1d6c-41bc-a393-621db78cf6a5" providerId="ADAL" clId="{0CC6D829-E0AE-4FA6-8314-5F4DCCE3D807}" dt="2019-04-11T02:12:01.712" v="191" actId="27636"/>
+          <ac:spMkLst>
+            <pc:docMk/>
+            <pc:sldMk cId="3323114340" sldId="288"/>
+            <ac:spMk id="3" creationId="{FE7A19F1-3525-4AD7-8535-2E731EE8C158}"/>
+          </ac:spMkLst>
+        </pc:spChg>
+        <pc:spChg chg="mod">
+          <ac:chgData name="Gupta, Nikhil" userId="7ec69372-1d6c-41bc-a393-621db78cf6a5" providerId="ADAL" clId="{0CC6D829-E0AE-4FA6-8314-5F4DCCE3D807}" dt="2019-04-11T02:12:20.965" v="198" actId="14100"/>
+          <ac:spMkLst>
+            <pc:docMk/>
+            <pc:sldMk cId="3323114340" sldId="288"/>
+            <ac:spMk id="4" creationId="{DE5BD002-FE80-4A0B-8F1C-7C7A541CAD7A}"/>
+          </ac:spMkLst>
+        </pc:spChg>
+        <pc:picChg chg="add mod">
+          <ac:chgData name="Gupta, Nikhil" userId="7ec69372-1d6c-41bc-a393-621db78cf6a5" providerId="ADAL" clId="{0CC6D829-E0AE-4FA6-8314-5F4DCCE3D807}" dt="2019-04-11T02:15:05.332" v="310" actId="1076"/>
+          <ac:picMkLst>
+            <pc:docMk/>
+            <pc:sldMk cId="3323114340" sldId="288"/>
+            <ac:picMk id="5" creationId="{5FA60904-87AF-4E1B-B0BE-F9253614F18D}"/>
+          </ac:picMkLst>
+        </pc:picChg>
+        <pc:picChg chg="add mod">
+          <ac:chgData name="Gupta, Nikhil" userId="7ec69372-1d6c-41bc-a393-621db78cf6a5" providerId="ADAL" clId="{0CC6D829-E0AE-4FA6-8314-5F4DCCE3D807}" dt="2019-04-11T02:15:15.325" v="314" actId="1076"/>
+          <ac:picMkLst>
+            <pc:docMk/>
+            <pc:sldMk cId="3323114340" sldId="288"/>
+            <ac:picMk id="6" creationId="{EFDB78C1-112D-4347-AF57-45D54118CD5B}"/>
+          </ac:picMkLst>
+        </pc:picChg>
+      </pc:sldChg>
+      <pc:sldChg chg="modSp">
+        <pc:chgData name="Gupta, Nikhil" userId="7ec69372-1d6c-41bc-a393-621db78cf6a5" providerId="ADAL" clId="{0CC6D829-E0AE-4FA6-8314-5F4DCCE3D807}" dt="2019-04-11T02:37:44.182" v="538" actId="113"/>
+        <pc:sldMkLst>
+          <pc:docMk/>
+          <pc:sldMk cId="30226420" sldId="289"/>
+        </pc:sldMkLst>
+        <pc:spChg chg="mod">
+          <ac:chgData name="Gupta, Nikhil" userId="7ec69372-1d6c-41bc-a393-621db78cf6a5" providerId="ADAL" clId="{0CC6D829-E0AE-4FA6-8314-5F4DCCE3D807}" dt="2019-04-11T02:37:44.182" v="538" actId="113"/>
+          <ac:spMkLst>
+            <pc:docMk/>
+            <pc:sldMk cId="30226420" sldId="289"/>
+            <ac:spMk id="3" creationId="{F060EE6D-2EAF-417B-9D76-64381F370565}"/>
+          </ac:spMkLst>
+        </pc:spChg>
+      </pc:sldChg>
+      <pc:sldChg chg="modSp">
+        <pc:chgData name="Gupta, Nikhil" userId="7ec69372-1d6c-41bc-a393-621db78cf6a5" providerId="ADAL" clId="{0CC6D829-E0AE-4FA6-8314-5F4DCCE3D807}" dt="2019-04-11T02:18:55.093" v="442" actId="20577"/>
+        <pc:sldMkLst>
+          <pc:docMk/>
+          <pc:sldMk cId="2889654483" sldId="290"/>
+        </pc:sldMkLst>
+        <pc:spChg chg="mod">
+          <ac:chgData name="Gupta, Nikhil" userId="7ec69372-1d6c-41bc-a393-621db78cf6a5" providerId="ADAL" clId="{0CC6D829-E0AE-4FA6-8314-5F4DCCE3D807}" dt="2019-04-11T02:18:55.093" v="442" actId="20577"/>
+          <ac:spMkLst>
+            <pc:docMk/>
+            <pc:sldMk cId="2889654483" sldId="290"/>
+            <ac:spMk id="10" creationId="{34DD3247-9BA4-48E9-9CC5-B19B1AD0154E}"/>
+          </ac:spMkLst>
+        </pc:spChg>
+      </pc:sldChg>
+      <pc:sldChg chg="modSp">
+        <pc:chgData name="Gupta, Nikhil" userId="7ec69372-1d6c-41bc-a393-621db78cf6a5" providerId="ADAL" clId="{0CC6D829-E0AE-4FA6-8314-5F4DCCE3D807}" dt="2019-04-11T02:21:20.494" v="452" actId="113"/>
+        <pc:sldMkLst>
+          <pc:docMk/>
+          <pc:sldMk cId="2901468806" sldId="291"/>
+        </pc:sldMkLst>
+        <pc:spChg chg="mod">
+          <ac:chgData name="Gupta, Nikhil" userId="7ec69372-1d6c-41bc-a393-621db78cf6a5" providerId="ADAL" clId="{0CC6D829-E0AE-4FA6-8314-5F4DCCE3D807}" dt="2019-04-11T02:21:14.046" v="449" actId="113"/>
+          <ac:spMkLst>
+            <pc:docMk/>
+            <pc:sldMk cId="2901468806" sldId="291"/>
+            <ac:spMk id="16" creationId="{9B03715F-8854-4976-9533-A920600B4945}"/>
+          </ac:spMkLst>
+        </pc:spChg>
+        <pc:graphicFrameChg chg="modGraphic">
+          <ac:chgData name="Gupta, Nikhil" userId="7ec69372-1d6c-41bc-a393-621db78cf6a5" providerId="ADAL" clId="{0CC6D829-E0AE-4FA6-8314-5F4DCCE3D807}" dt="2019-04-11T02:21:20.494" v="452" actId="113"/>
+          <ac:graphicFrameMkLst>
+            <pc:docMk/>
+            <pc:sldMk cId="2901468806" sldId="291"/>
+            <ac:graphicFrameMk id="4" creationId="{1EC15DB3-5DF3-4BBC-B5B3-9A6DDBAB4389}"/>
+          </ac:graphicFrameMkLst>
+        </pc:graphicFrameChg>
+      </pc:sldChg>
+      <pc:sldChg chg="modSp">
+        <pc:chgData name="Gupta, Nikhil" userId="7ec69372-1d6c-41bc-a393-621db78cf6a5" providerId="ADAL" clId="{0CC6D829-E0AE-4FA6-8314-5F4DCCE3D807}" dt="2019-04-11T02:24:40.709" v="536" actId="1036"/>
+        <pc:sldMkLst>
+          <pc:docMk/>
+          <pc:sldMk cId="882844237" sldId="292"/>
+        </pc:sldMkLst>
+        <pc:spChg chg="mod">
+          <ac:chgData name="Gupta, Nikhil" userId="7ec69372-1d6c-41bc-a393-621db78cf6a5" providerId="ADAL" clId="{0CC6D829-E0AE-4FA6-8314-5F4DCCE3D807}" dt="2019-04-11T02:23:46.640" v="501" actId="20577"/>
+          <ac:spMkLst>
+            <pc:docMk/>
+            <pc:sldMk cId="882844237" sldId="292"/>
+            <ac:spMk id="3" creationId="{8FC42E23-FD47-4F8D-A843-39EE18B93C33}"/>
+          </ac:spMkLst>
+        </pc:spChg>
+        <pc:spChg chg="mod">
+          <ac:chgData name="Gupta, Nikhil" userId="7ec69372-1d6c-41bc-a393-621db78cf6a5" providerId="ADAL" clId="{0CC6D829-E0AE-4FA6-8314-5F4DCCE3D807}" dt="2019-04-11T02:24:32.212" v="529" actId="1036"/>
+          <ac:spMkLst>
+            <pc:docMk/>
+            <pc:sldMk cId="882844237" sldId="292"/>
+            <ac:spMk id="9" creationId="{BEFF799B-9289-4F21-B1C1-07515DD2FAAD}"/>
+          </ac:spMkLst>
+        </pc:spChg>
+        <pc:spChg chg="mod">
+          <ac:chgData name="Gupta, Nikhil" userId="7ec69372-1d6c-41bc-a393-621db78cf6a5" providerId="ADAL" clId="{0CC6D829-E0AE-4FA6-8314-5F4DCCE3D807}" dt="2019-04-11T02:24:40.709" v="536" actId="1036"/>
+          <ac:spMkLst>
+            <pc:docMk/>
+            <pc:sldMk cId="882844237" sldId="292"/>
+            <ac:spMk id="10" creationId="{B87BE7DD-C673-44E0-94E9-7F2FDEFC2968}"/>
+          </ac:spMkLst>
+        </pc:spChg>
+        <pc:graphicFrameChg chg="mod">
+          <ac:chgData name="Gupta, Nikhil" userId="7ec69372-1d6c-41bc-a393-621db78cf6a5" providerId="ADAL" clId="{0CC6D829-E0AE-4FA6-8314-5F4DCCE3D807}" dt="2019-04-11T02:23:50.536" v="502" actId="1076"/>
+          <ac:graphicFrameMkLst>
+            <pc:docMk/>
+            <pc:sldMk cId="882844237" sldId="292"/>
+            <ac:graphicFrameMk id="8" creationId="{532EE075-F629-40B3-B88B-0FF62718AB7B}"/>
+          </ac:graphicFrameMkLst>
+        </pc:graphicFrameChg>
+        <pc:picChg chg="mod">
+          <ac:chgData name="Gupta, Nikhil" userId="7ec69372-1d6c-41bc-a393-621db78cf6a5" providerId="ADAL" clId="{0CC6D829-E0AE-4FA6-8314-5F4DCCE3D807}" dt="2019-04-11T02:24:32.212" v="529" actId="1036"/>
+          <ac:picMkLst>
+            <pc:docMk/>
+            <pc:sldMk cId="882844237" sldId="292"/>
+            <ac:picMk id="1026" creationId="{71692892-E341-4AA0-9257-674384367380}"/>
+          </ac:picMkLst>
+        </pc:picChg>
+        <pc:picChg chg="mod">
+          <ac:chgData name="Gupta, Nikhil" userId="7ec69372-1d6c-41bc-a393-621db78cf6a5" providerId="ADAL" clId="{0CC6D829-E0AE-4FA6-8314-5F4DCCE3D807}" dt="2019-04-11T02:24:40.709" v="536" actId="1036"/>
+          <ac:picMkLst>
+            <pc:docMk/>
+            <pc:sldMk cId="882844237" sldId="292"/>
+            <ac:picMk id="1028" creationId="{ED00EDBC-0828-463B-91BD-EB8BE904C850}"/>
+          </ac:picMkLst>
+        </pc:picChg>
       </pc:sldChg>
     </pc:docChg>
   </pc:docChgLst>
@@ -17067,7 +17291,7 @@
             <a:fld id="{B61BEF0D-F0BB-DE4B-95CE-6DB70DBA9567}" type="datetimeFigureOut">
               <a:rPr lang="en-US" smtClean="0"/>
               <a:pPr/>
-              <a:t>4/8/2019</a:t>
+              <a:t>4/12/2019</a:t>
             </a:fld>
             <a:endParaRPr lang="en-US"/>
           </a:p>
@@ -17250,7 +17474,7 @@
             <a:fld id="{B61BEF0D-F0BB-DE4B-95CE-6DB70DBA9567}" type="datetimeFigureOut">
               <a:rPr lang="en-US" smtClean="0"/>
               <a:pPr/>
-              <a:t>4/8/2019</a:t>
+              <a:t>4/12/2019</a:t>
             </a:fld>
             <a:endParaRPr lang="en-US" dirty="0"/>
           </a:p>
@@ -17503,7 +17727,7 @@
             <a:fld id="{B61BEF0D-F0BB-DE4B-95CE-6DB70DBA9567}" type="datetimeFigureOut">
               <a:rPr lang="en-US" smtClean="0"/>
               <a:pPr/>
-              <a:t>4/8/2019</a:t>
+              <a:t>4/12/2019</a:t>
             </a:fld>
             <a:endParaRPr lang="en-US" dirty="0"/>
           </a:p>
@@ -17738,7 +17962,7 @@
             <a:fld id="{B61BEF0D-F0BB-DE4B-95CE-6DB70DBA9567}" type="datetimeFigureOut">
               <a:rPr lang="en-US" smtClean="0"/>
               <a:pPr/>
-              <a:t>4/8/2019</a:t>
+              <a:t>4/12/2019</a:t>
             </a:fld>
             <a:endParaRPr lang="en-US" dirty="0"/>
           </a:p>
@@ -18122,7 +18346,7 @@
             <a:fld id="{B61BEF0D-F0BB-DE4B-95CE-6DB70DBA9567}" type="datetimeFigureOut">
               <a:rPr lang="en-US" smtClean="0"/>
               <a:pPr/>
-              <a:t>4/8/2019</a:t>
+              <a:t>4/12/2019</a:t>
             </a:fld>
             <a:endParaRPr lang="en-US" dirty="0"/>
           </a:p>
@@ -18243,7 +18467,7 @@
             <a:fld id="{B61BEF0D-F0BB-DE4B-95CE-6DB70DBA9567}" type="datetimeFigureOut">
               <a:rPr lang="en-US" smtClean="0"/>
               <a:pPr/>
-              <a:t>4/8/2019</a:t>
+              <a:t>4/12/2019</a:t>
             </a:fld>
             <a:endParaRPr lang="en-US" dirty="0"/>
           </a:p>
@@ -18341,7 +18565,7 @@
             <a:fld id="{B61BEF0D-F0BB-DE4B-95CE-6DB70DBA9567}" type="datetimeFigureOut">
               <a:rPr lang="en-US" smtClean="0"/>
               <a:pPr/>
-              <a:t>4/8/2019</a:t>
+              <a:t>4/12/2019</a:t>
             </a:fld>
             <a:endParaRPr lang="en-US" dirty="0"/>
           </a:p>
@@ -18593,7 +18817,7 @@
             <a:fld id="{B61BEF0D-F0BB-DE4B-95CE-6DB70DBA9567}" type="datetimeFigureOut">
               <a:rPr lang="en-US" smtClean="0"/>
               <a:pPr/>
-              <a:t>4/8/2019</a:t>
+              <a:t>4/12/2019</a:t>
             </a:fld>
             <a:endParaRPr lang="en-US" dirty="0"/>
           </a:p>
@@ -18876,7 +19100,7 @@
             <a:fld id="{B61BEF0D-F0BB-DE4B-95CE-6DB70DBA9567}" type="datetimeFigureOut">
               <a:rPr lang="en-US" smtClean="0"/>
               <a:pPr/>
-              <a:t>4/8/2019</a:t>
+              <a:t>4/12/2019</a:t>
             </a:fld>
             <a:endParaRPr lang="en-US" dirty="0"/>
           </a:p>
@@ -19309,7 +19533,7 @@
             <a:fld id="{B61BEF0D-F0BB-DE4B-95CE-6DB70DBA9567}" type="datetimeFigureOut">
               <a:rPr lang="en-US" smtClean="0"/>
               <a:pPr/>
-              <a:t>4/8/2019</a:t>
+              <a:t>4/12/2019</a:t>
             </a:fld>
             <a:endParaRPr lang="en-US" dirty="0"/>
           </a:p>
@@ -19508,7 +19732,7 @@
             <a:fld id="{B61BEF0D-F0BB-DE4B-95CE-6DB70DBA9567}" type="datetimeFigureOut">
               <a:rPr lang="en-US" smtClean="0"/>
               <a:pPr/>
-              <a:t>4/8/2019</a:t>
+              <a:t>4/12/2019</a:t>
             </a:fld>
             <a:endParaRPr lang="en-US" dirty="0"/>
           </a:p>
@@ -19774,7 +19998,7 @@
             <a:fld id="{B61BEF0D-F0BB-DE4B-95CE-6DB70DBA9567}" type="datetimeFigureOut">
               <a:rPr lang="en-US" smtClean="0"/>
               <a:pPr/>
-              <a:t>4/8/2019</a:t>
+              <a:t>4/12/2019</a:t>
             </a:fld>
             <a:endParaRPr lang="en-US" dirty="0"/>
           </a:p>
@@ -20211,7 +20435,7 @@
             <a:fld id="{B61BEF0D-F0BB-DE4B-95CE-6DB70DBA9567}" type="datetimeFigureOut">
               <a:rPr lang="en-US" smtClean="0"/>
               <a:pPr/>
-              <a:t>4/8/2019</a:t>
+              <a:t>4/12/2019</a:t>
             </a:fld>
             <a:endParaRPr lang="en-US" dirty="0"/>
           </a:p>
@@ -20760,7 +20984,7 @@
             <a:fld id="{B61BEF0D-F0BB-DE4B-95CE-6DB70DBA9567}" type="datetimeFigureOut">
               <a:rPr lang="en-US" smtClean="0"/>
               <a:pPr/>
-              <a:t>4/8/2019</a:t>
+              <a:t>4/12/2019</a:t>
             </a:fld>
             <a:endParaRPr lang="en-US" dirty="0"/>
           </a:p>
@@ -21483,7 +21707,7 @@
             <a:fld id="{B61BEF0D-F0BB-DE4B-95CE-6DB70DBA9567}" type="datetimeFigureOut">
               <a:rPr lang="en-US" smtClean="0"/>
               <a:pPr/>
-              <a:t>4/8/2019</a:t>
+              <a:t>4/12/2019</a:t>
             </a:fld>
             <a:endParaRPr lang="en-US" dirty="0"/>
           </a:p>
@@ -21656,7 +21880,7 @@
             <a:fld id="{B61BEF0D-F0BB-DE4B-95CE-6DB70DBA9567}" type="datetimeFigureOut">
               <a:rPr lang="en-US" smtClean="0"/>
               <a:pPr/>
-              <a:t>4/8/2019</a:t>
+              <a:t>4/12/2019</a:t>
             </a:fld>
             <a:endParaRPr lang="en-US" dirty="0"/>
           </a:p>
@@ -21839,7 +22063,7 @@
             <a:fld id="{B61BEF0D-F0BB-DE4B-95CE-6DB70DBA9567}" type="datetimeFigureOut">
               <a:rPr lang="en-US" smtClean="0"/>
               <a:pPr/>
-              <a:t>4/8/2019</a:t>
+              <a:t>4/12/2019</a:t>
             </a:fld>
             <a:endParaRPr lang="en-US" dirty="0"/>
           </a:p>
@@ -30991,7 +31215,7 @@
             <a:fld id="{48A87A34-81AB-432B-8DAE-1953F412C126}" type="datetimeFigureOut">
               <a:rPr lang="en-US" dirty="0"/>
               <a:pPr/>
-              <a:t>4/8/2019</a:t>
+              <a:t>4/12/2019</a:t>
             </a:fld>
             <a:endParaRPr lang="en-US"/>
           </a:p>
@@ -31468,7 +31692,7 @@
           <a:p>
             <a:r>
               <a:rPr lang="en-US" dirty="0"/>
-              <a:t>Joanna Duran, Nikhil Gupta, Max Moro</a:t>
+              <a:t>Nikhil Gupta, Max Moro, Joanna Duran</a:t>
             </a:r>
           </a:p>
         </p:txBody>
@@ -41696,7 +41920,12 @@
             <p:ph type="title"/>
           </p:nvPr>
         </p:nvSpPr>
-        <p:spPr/>
+        <p:spPr>
+          <a:xfrm>
+            <a:off x="2210464" y="476574"/>
+            <a:ext cx="5920122" cy="1088571"/>
+          </a:xfrm>
+        </p:spPr>
         <p:txBody>
           <a:bodyPr>
             <a:normAutofit/>
@@ -41731,7 +41960,12 @@
                 <p:ph idx="1"/>
               </p:nvPr>
             </p:nvSpPr>
-            <p:spPr/>
+            <p:spPr>
+              <a:xfrm>
+                <a:off x="7916245" y="1133409"/>
+                <a:ext cx="9044694" cy="7777344"/>
+              </a:xfrm>
+            </p:spPr>
             <p:txBody>
               <a:bodyPr>
                 <a:noAutofit/>
@@ -41770,7 +42004,7 @@
                     <a:latin typeface="Arial" panose="020B0604020202020204" pitchFamily="34" charset="0"/>
                     <a:cs typeface="Arial" panose="020B0604020202020204" pitchFamily="34" charset="0"/>
                   </a:rPr>
-                  <a:t>One of the highly correlated features, x18, transformed with square root.</a:t>
+                  <a:t>None of the features were highly correlated to the output, hence we had low prediction capability.</a:t>
                 </a:r>
               </a:p>
               <a:p>
@@ -41815,14 +42049,27 @@
                     <a:latin typeface="Arial" panose="020B0604020202020204" pitchFamily="34" charset="0"/>
                     <a:cs typeface="Arial" panose="020B0604020202020204" pitchFamily="34" charset="0"/>
                   </a:rPr>
-                  <a:t>is 0.2275 which is low and expected based on low correlation of features to outputs.</a:t>
+                  <a:t> is 0.2275 which is low and expected.</a:t>
+                </a:r>
+                <a:endParaRPr lang="en-US" sz="2800" i="1" dirty="0">
+                  <a:latin typeface="Arial" panose="020B0604020202020204" pitchFamily="34" charset="0"/>
+                  <a:cs typeface="Arial" panose="020B0604020202020204" pitchFamily="34" charset="0"/>
+                </a:endParaRPr>
+              </a:p>
+              <a:p>
+                <a:r>
+                  <a:rPr lang="en-US" sz="2800" dirty="0">
+                    <a:latin typeface="Arial" panose="020B0604020202020204" pitchFamily="34" charset="0"/>
+                    <a:cs typeface="Arial" panose="020B0604020202020204" pitchFamily="34" charset="0"/>
+                  </a:rPr>
+                  <a:t>Full model suffers from assumption violations</a:t>
                 </a:r>
                 <a:r>
                   <a:rPr lang="en-US" sz="2800" i="1" dirty="0">
                     <a:latin typeface="Arial" panose="020B0604020202020204" pitchFamily="34" charset="0"/>
                     <a:cs typeface="Arial" panose="020B0604020202020204" pitchFamily="34" charset="0"/>
                   </a:rPr>
-                  <a:t>           </a:t>
+                  <a:t>        </a:t>
                 </a:r>
                 <a:endParaRPr lang="en-US" sz="2800" dirty="0">
                   <a:latin typeface="Arial" panose="020B0604020202020204" pitchFamily="34" charset="0"/>
@@ -41836,6 +42083,15 @@
                     <a:cs typeface="Arial" panose="020B0604020202020204" pitchFamily="34" charset="0"/>
                   </a:rPr>
                   <a:t>The influence statistics were also analyzed and from the Cook’s D plot we notice that there are 288 points beyond the 4/n line). But there is no justification to remove them.</a:t>
+                </a:r>
+              </a:p>
+              <a:p>
+                <a:r>
+                  <a:rPr lang="en-US" sz="2800" dirty="0">
+                    <a:latin typeface="Arial" panose="020B0604020202020204" pitchFamily="34" charset="0"/>
+                    <a:cs typeface="Arial" panose="020B0604020202020204" pitchFamily="34" charset="0"/>
+                  </a:rPr>
+                  <a:t>Could not perform 2-way interaction of variables.</a:t>
                 </a:r>
               </a:p>
             </p:txBody>
@@ -41859,10 +42115,14 @@
               </p:nvPr>
             </p:nvSpPr>
             <p:spPr>
+              <a:xfrm>
+                <a:off x="7916245" y="1133409"/>
+                <a:ext cx="9044694" cy="7777344"/>
+              </a:xfrm>
               <a:blipFill>
                 <a:blip r:embed="rId2"/>
                 <a:stretch>
-                  <a:fillRect l="-1753" t="-3762" r="-1214" b="-4702"/>
+                  <a:fillRect l="-1753" t="-9483" r="-1214" b="-10972"/>
                 </a:stretch>
               </a:blipFill>
             </p:spPr>
@@ -41897,7 +42157,12 @@
             <p:ph type="body" sz="half" idx="2"/>
           </p:nvPr>
         </p:nvSpPr>
-        <p:spPr/>
+        <p:spPr>
+          <a:xfrm>
+            <a:off x="2207217" y="1783320"/>
+            <a:ext cx="5920122" cy="916337"/>
+          </a:xfrm>
+        </p:spPr>
         <p:txBody>
           <a:bodyPr>
             <a:normAutofit/>
@@ -41909,11 +42174,67 @@
                 <a:latin typeface="Arial" panose="020B0604020202020204" pitchFamily="34" charset="0"/>
                 <a:cs typeface="Arial" panose="020B0604020202020204" pitchFamily="34" charset="0"/>
               </a:rPr>
-              <a:t>Synopsis of steps taken in Project1</a:t>
+              <a:t>Synopsis</a:t>
             </a:r>
           </a:p>
         </p:txBody>
       </p:sp>
+      <p:pic>
+        <p:nvPicPr>
+          <p:cNvPr id="8" name="Picture 7">
+            <a:extLst>
+              <a:ext uri="{FF2B5EF4-FFF2-40B4-BE49-F238E27FC236}">
+                <a16:creationId xmlns:a16="http://schemas.microsoft.com/office/drawing/2014/main" id="{B9A76E54-9A65-4E10-B07F-B4F138E02C9C}"/>
+              </a:ext>
+            </a:extLst>
+          </p:cNvPr>
+          <p:cNvPicPr/>
+          <p:nvPr/>
+        </p:nvPicPr>
+        <p:blipFill>
+          <a:blip r:embed="rId3"/>
+          <a:stretch>
+            <a:fillRect/>
+          </a:stretch>
+        </p:blipFill>
+        <p:spPr>
+          <a:xfrm>
+            <a:off x="2207216" y="6137956"/>
+            <a:ext cx="5166041" cy="3482968"/>
+          </a:xfrm>
+          <a:prstGeom prst="rect">
+            <a:avLst/>
+          </a:prstGeom>
+        </p:spPr>
+      </p:pic>
+      <p:pic>
+        <p:nvPicPr>
+          <p:cNvPr id="9" name="Picture 8">
+            <a:extLst>
+              <a:ext uri="{FF2B5EF4-FFF2-40B4-BE49-F238E27FC236}">
+                <a16:creationId xmlns:a16="http://schemas.microsoft.com/office/drawing/2014/main" id="{AB2B7E26-B6F2-420C-8127-C0673954A42F}"/>
+              </a:ext>
+            </a:extLst>
+          </p:cNvPr>
+          <p:cNvPicPr/>
+          <p:nvPr/>
+        </p:nvPicPr>
+        <p:blipFill>
+          <a:blip r:embed="rId4"/>
+          <a:stretch>
+            <a:fillRect/>
+          </a:stretch>
+        </p:blipFill>
+        <p:spPr>
+          <a:xfrm>
+            <a:off x="2207216" y="2569489"/>
+            <a:ext cx="5166041" cy="3482968"/>
+          </a:xfrm>
+          <a:prstGeom prst="rect">
+            <a:avLst/>
+          </a:prstGeom>
+        </p:spPr>
+      </p:pic>
     </p:spTree>
     <p:extLst>
       <p:ext uri="{BB962C8B-B14F-4D97-AF65-F5344CB8AC3E}">
@@ -41960,7 +42281,12 @@
             <p:ph type="title"/>
           </p:nvPr>
         </p:nvSpPr>
-        <p:spPr/>
+        <p:spPr>
+          <a:xfrm>
+            <a:off x="1760521" y="912003"/>
+            <a:ext cx="5920122" cy="1032911"/>
+          </a:xfrm>
+        </p:spPr>
         <p:txBody>
           <a:bodyPr>
             <a:normAutofit/>
@@ -41995,13 +42321,13 @@
         </p:nvSpPr>
         <p:spPr>
           <a:xfrm>
-            <a:off x="7626549" y="667377"/>
-            <a:ext cx="9579127" cy="9592636"/>
+            <a:off x="7910285" y="667377"/>
+            <a:ext cx="10203543" cy="9592636"/>
           </a:xfrm>
         </p:spPr>
         <p:txBody>
           <a:bodyPr>
-            <a:normAutofit/>
+            <a:normAutofit lnSpcReduction="10000"/>
           </a:bodyPr>
           <a:lstStyle/>
           <a:p>
@@ -42060,7 +42386,7 @@
                 <a:latin typeface="Arial" panose="020B0604020202020204" pitchFamily="34" charset="0"/>
                 <a:cs typeface="Arial" panose="020B0604020202020204" pitchFamily="34" charset="0"/>
               </a:rPr>
-              <a:t>LARS.</a:t>
+              <a:t>LARS</a:t>
             </a:r>
           </a:p>
           <a:p>
@@ -42069,7 +42395,7 @@
                 <a:latin typeface="Arial" panose="020B0604020202020204" pitchFamily="34" charset="0"/>
                 <a:cs typeface="Arial" panose="020B0604020202020204" pitchFamily="34" charset="0"/>
               </a:rPr>
-              <a:t>We found that all techniques give essentially the same fit statistics. The best model is Backward Elimination. </a:t>
+              <a:t>We found that all techniques give essentially the same fit statistics. The best model is Backward Elimination based on low # predictors. </a:t>
             </a:r>
           </a:p>
           <a:p>
@@ -42105,7 +42431,12 @@
             <p:ph type="body" sz="half" idx="2"/>
           </p:nvPr>
         </p:nvSpPr>
-        <p:spPr/>
+        <p:spPr>
+          <a:xfrm>
+            <a:off x="1760521" y="2174997"/>
+            <a:ext cx="5920122" cy="1032911"/>
+          </a:xfrm>
+        </p:spPr>
         <p:txBody>
           <a:bodyPr>
             <a:normAutofit/>
@@ -42117,11 +42448,67 @@
                 <a:latin typeface="Arial" panose="020B0604020202020204" pitchFamily="34" charset="0"/>
                 <a:cs typeface="Arial" panose="020B0604020202020204" pitchFamily="34" charset="0"/>
               </a:rPr>
-              <a:t>Synopsis of steps taken in Project1- Continued</a:t>
+              <a:t>Synopsis - Continued</a:t>
             </a:r>
           </a:p>
         </p:txBody>
       </p:sp>
+      <p:pic>
+        <p:nvPicPr>
+          <p:cNvPr id="5" name="Picture 4">
+            <a:extLst>
+              <a:ext uri="{FF2B5EF4-FFF2-40B4-BE49-F238E27FC236}">
+                <a16:creationId xmlns:a16="http://schemas.microsoft.com/office/drawing/2014/main" id="{5FA60904-87AF-4E1B-B0BE-F9253614F18D}"/>
+              </a:ext>
+            </a:extLst>
+          </p:cNvPr>
+          <p:cNvPicPr/>
+          <p:nvPr/>
+        </p:nvPicPr>
+        <p:blipFill>
+          <a:blip r:embed="rId2"/>
+          <a:stretch>
+            <a:fillRect/>
+          </a:stretch>
+        </p:blipFill>
+        <p:spPr>
+          <a:xfrm>
+            <a:off x="1189461" y="3075441"/>
+            <a:ext cx="6546652" cy="2054565"/>
+          </a:xfrm>
+          <a:prstGeom prst="rect">
+            <a:avLst/>
+          </a:prstGeom>
+        </p:spPr>
+      </p:pic>
+      <p:pic>
+        <p:nvPicPr>
+          <p:cNvPr id="6" name="Picture 5">
+            <a:extLst>
+              <a:ext uri="{FF2B5EF4-FFF2-40B4-BE49-F238E27FC236}">
+                <a16:creationId xmlns:a16="http://schemas.microsoft.com/office/drawing/2014/main" id="{EFDB78C1-112D-4347-AF57-45D54118CD5B}"/>
+              </a:ext>
+            </a:extLst>
+          </p:cNvPr>
+          <p:cNvPicPr/>
+          <p:nvPr/>
+        </p:nvPicPr>
+        <p:blipFill>
+          <a:blip r:embed="rId3"/>
+          <a:stretch>
+            <a:fillRect/>
+          </a:stretch>
+        </p:blipFill>
+        <p:spPr>
+          <a:xfrm>
+            <a:off x="1980489" y="5463695"/>
+            <a:ext cx="4964596" cy="3680305"/>
+          </a:xfrm>
+          <a:prstGeom prst="rect">
+            <a:avLst/>
+          </a:prstGeom>
+        </p:spPr>
+      </p:pic>
     </p:spTree>
     <p:extLst>
       <p:ext uri="{BB962C8B-B14F-4D97-AF65-F5344CB8AC3E}">
@@ -42269,11 +42656,11 @@
               </a:spcBef>
             </a:pPr>
             <a:r>
-              <a:rPr lang="en-US" b="1" dirty="0">
+              <a:rPr lang="en-US" dirty="0">
                 <a:latin typeface="Arial" panose="020B0604020202020204" pitchFamily="34" charset="0"/>
                 <a:cs typeface="Arial" panose="020B0604020202020204" pitchFamily="34" charset="0"/>
               </a:rPr>
-              <a:t>Principal Component Regression with intelligent feature engineering/selection</a:t>
+              <a:t>Principal Component Regression with intelligent feature engineering and selection</a:t>
             </a:r>
           </a:p>
           <a:p>
@@ -42303,7 +42690,7 @@
               </a:spcBef>
             </a:pPr>
             <a:r>
-              <a:rPr lang="en-US" b="1" dirty="0">
+              <a:rPr lang="en-US" dirty="0">
                 <a:latin typeface="Arial" panose="020B0604020202020204" pitchFamily="34" charset="0"/>
                 <a:cs typeface="Arial" panose="020B0604020202020204" pitchFamily="34" charset="0"/>
               </a:rPr>
@@ -42405,7 +42792,7 @@
         </p:spPr>
         <p:txBody>
           <a:bodyPr>
-            <a:normAutofit lnSpcReduction="10000"/>
+            <a:normAutofit fontScale="92500" lnSpcReduction="10000"/>
           </a:bodyPr>
           <a:lstStyle/>
           <a:p>
@@ -42433,7 +42820,7 @@
                 <a:latin typeface="Arial" panose="020B0604020202020204" pitchFamily="34" charset="0"/>
                 <a:cs typeface="Arial" panose="020B0604020202020204" pitchFamily="34" charset="0"/>
               </a:rPr>
-              <a:t>Performing intelligent feature engineering using semiconductor domain expertise, which included theoretical equations from semiconductor</a:t>
+              <a:t>Performing intelligent feature engineering using semiconductor domain expertise, which included theoretical equations from semiconductor.</a:t>
             </a:r>
           </a:p>
           <a:p>
@@ -42513,6 +42900,20 @@
                 <a:cs typeface="Arial" panose="020B0604020202020204" pitchFamily="34" charset="0"/>
               </a:rPr>
               <a:t>This data was then used to train various classification models including Linear/Quadratic Discriminate Analysis (LDA/QDA) and Logistic Regression models.  </a:t>
+            </a:r>
+          </a:p>
+          <a:p>
+            <a:pPr lvl="1">
+              <a:spcBef>
+                <a:spcPts val="0"/>
+              </a:spcBef>
+            </a:pPr>
+            <a:r>
+              <a:rPr lang="en-US" sz="3001" dirty="0">
+                <a:latin typeface="Arial" panose="020B0604020202020204" pitchFamily="34" charset="0"/>
+                <a:cs typeface="Arial" panose="020B0604020202020204" pitchFamily="34" charset="0"/>
+              </a:rPr>
+              <a:t>This class variable could then be used in the eventual linear regression model to improve predictions.</a:t>
             </a:r>
           </a:p>
         </p:txBody>
@@ -42694,7 +43095,7 @@
           <p:nvPr>
             <p:extLst>
               <p:ext uri="{D42A27DB-BD31-4B8C-83A1-F6EECF244321}">
-                <p14:modId xmlns:p14="http://schemas.microsoft.com/office/powerpoint/2010/main" val="2414104592"/>
+                <p14:modId xmlns:p14="http://schemas.microsoft.com/office/powerpoint/2010/main" val="322679491"/>
               </p:ext>
             </p:extLst>
           </p:nvPr>
@@ -42731,14 +43132,14 @@
                         </a:spcAft>
                       </a:pPr>
                       <a:r>
-                        <a:rPr lang="it-IT" sz="1400" dirty="0">
+                        <a:rPr lang="it-IT" sz="1400" b="1" dirty="0">
                           <a:effectLst/>
                           <a:latin typeface="Consolas" panose="020B0609020204030204" pitchFamily="49" charset="0"/>
                           <a:ea typeface="Cambria" panose="02040503050406030204" pitchFamily="18" charset="0"/>
                         </a:rPr>
                         <a:t>data$x2byx1 = data$x2/data$x1</a:t>
                       </a:r>
-                      <a:endParaRPr lang="en-US" sz="1400" dirty="0">
+                      <a:endParaRPr lang="en-US" sz="1400" b="1" dirty="0">
                         <a:effectLst/>
                         <a:latin typeface="Times New Roman" panose="02020603050405020304" pitchFamily="18" charset="0"/>
                         <a:ea typeface="Times New Roman" panose="02020603050405020304" pitchFamily="18" charset="0"/>
@@ -42754,14 +43155,14 @@
                         </a:spcAft>
                       </a:pPr>
                       <a:r>
-                        <a:rPr lang="it-IT" sz="1400" dirty="0">
+                        <a:rPr lang="it-IT" sz="1400" b="1" dirty="0">
                           <a:effectLst/>
                           <a:latin typeface="Consolas" panose="020B0609020204030204" pitchFamily="49" charset="0"/>
                           <a:ea typeface="Cambria" panose="02040503050406030204" pitchFamily="18" charset="0"/>
                         </a:rPr>
                         <a:t>data$x6byx5 = data$x6/data$x5</a:t>
                       </a:r>
-                      <a:endParaRPr lang="en-US" sz="1400" dirty="0">
+                      <a:endParaRPr lang="en-US" sz="1400" b="1" dirty="0">
                         <a:effectLst/>
                         <a:latin typeface="Times New Roman" panose="02020603050405020304" pitchFamily="18" charset="0"/>
                         <a:ea typeface="Times New Roman" panose="02020603050405020304" pitchFamily="18" charset="0"/>
@@ -42777,14 +43178,14 @@
                         </a:spcAft>
                       </a:pPr>
                       <a:r>
-                        <a:rPr lang="it-IT" sz="1400" dirty="0">
+                        <a:rPr lang="it-IT" sz="1400" b="1" dirty="0">
                           <a:effectLst/>
                           <a:latin typeface="Consolas" panose="020B0609020204030204" pitchFamily="49" charset="0"/>
                           <a:ea typeface="Cambria" panose="02040503050406030204" pitchFamily="18" charset="0"/>
                         </a:rPr>
                         <a:t>data$x9byx7 = data$x9/data$x7</a:t>
                       </a:r>
-                      <a:endParaRPr lang="en-US" sz="1400" dirty="0">
+                      <a:endParaRPr lang="en-US" sz="1400" b="1" dirty="0">
                         <a:effectLst/>
                         <a:latin typeface="Times New Roman" panose="02020603050405020304" pitchFamily="18" charset="0"/>
                         <a:ea typeface="Times New Roman" panose="02020603050405020304" pitchFamily="18" charset="0"/>
@@ -42800,14 +43201,14 @@
                         </a:spcAft>
                       </a:pPr>
                       <a:r>
-                        <a:rPr lang="it-IT" sz="1400" dirty="0">
+                        <a:rPr lang="it-IT" sz="1400" b="1" dirty="0">
                           <a:effectLst/>
                           <a:latin typeface="Consolas" panose="020B0609020204030204" pitchFamily="49" charset="0"/>
                           <a:ea typeface="Cambria" panose="02040503050406030204" pitchFamily="18" charset="0"/>
                         </a:rPr>
                         <a:t>data$x10byx8 = data$x10/data$x8</a:t>
                       </a:r>
-                      <a:endParaRPr lang="en-US" sz="1400" dirty="0">
+                      <a:endParaRPr lang="en-US" sz="1400" b="1" dirty="0">
                         <a:effectLst/>
                         <a:latin typeface="Times New Roman" panose="02020603050405020304" pitchFamily="18" charset="0"/>
                         <a:ea typeface="Times New Roman" panose="02020603050405020304" pitchFamily="18" charset="0"/>
@@ -42823,14 +43224,14 @@
                         </a:spcAft>
                       </a:pPr>
                       <a:r>
-                        <a:rPr lang="it-IT" sz="1400" dirty="0">
+                        <a:rPr lang="it-IT" sz="1400" b="1" dirty="0">
                           <a:effectLst/>
                           <a:latin typeface="Consolas" panose="020B0609020204030204" pitchFamily="49" charset="0"/>
                           <a:ea typeface="Cambria" panose="02040503050406030204" pitchFamily="18" charset="0"/>
                         </a:rPr>
-                        <a:t>data$x14byx12=data$x14/data$x12</a:t>
+                        <a:t>data$x14byx12 = data$x14/data$x12</a:t>
                       </a:r>
-                      <a:endParaRPr lang="en-US" sz="1400" dirty="0">
+                      <a:endParaRPr lang="en-US" sz="1400" b="1" dirty="0">
                         <a:effectLst/>
                         <a:latin typeface="Times New Roman" panose="02020603050405020304" pitchFamily="18" charset="0"/>
                         <a:ea typeface="Times New Roman" panose="02020603050405020304" pitchFamily="18" charset="0"/>
@@ -42846,14 +43247,14 @@
                         </a:spcAft>
                       </a:pPr>
                       <a:r>
-                        <a:rPr lang="it-IT" sz="1400" dirty="0">
+                        <a:rPr lang="it-IT" sz="1400" b="1" dirty="0">
                           <a:effectLst/>
                           <a:latin typeface="Consolas" panose="020B0609020204030204" pitchFamily="49" charset="0"/>
                           <a:ea typeface="Cambria" panose="02040503050406030204" pitchFamily="18" charset="0"/>
                         </a:rPr>
                         <a:t>data$x1sqinv = 1/(data$x1)^2 </a:t>
                       </a:r>
-                      <a:endParaRPr lang="en-US" sz="1400" dirty="0">
+                      <a:endParaRPr lang="en-US" sz="1400" b="1" dirty="0">
                         <a:effectLst/>
                         <a:latin typeface="Times New Roman" panose="02020603050405020304" pitchFamily="18" charset="0"/>
                         <a:ea typeface="Times New Roman" panose="02020603050405020304" pitchFamily="18" charset="0"/>
@@ -42869,14 +43270,14 @@
                         </a:spcAft>
                       </a:pPr>
                       <a:r>
-                        <a:rPr lang="it-IT" sz="1400" dirty="0">
+                        <a:rPr lang="it-IT" sz="1400" b="1" dirty="0">
                           <a:effectLst/>
                           <a:latin typeface="Consolas" panose="020B0609020204030204" pitchFamily="49" charset="0"/>
                           <a:ea typeface="Cambria" panose="02040503050406030204" pitchFamily="18" charset="0"/>
                         </a:rPr>
                         <a:t>data$x5sqinv = 1/(data$x5)^2 </a:t>
                       </a:r>
-                      <a:endParaRPr lang="en-US" sz="1400" dirty="0">
+                      <a:endParaRPr lang="en-US" sz="1400" b="1" dirty="0">
                         <a:effectLst/>
                         <a:latin typeface="Times New Roman" panose="02020603050405020304" pitchFamily="18" charset="0"/>
                         <a:ea typeface="Times New Roman" panose="02020603050405020304" pitchFamily="18" charset="0"/>
@@ -42892,14 +43293,14 @@
                         </a:spcAft>
                       </a:pPr>
                       <a:r>
-                        <a:rPr lang="it-IT" sz="1400" dirty="0">
+                        <a:rPr lang="it-IT" sz="1400" b="1" dirty="0">
                           <a:effectLst/>
                           <a:latin typeface="Consolas" panose="020B0609020204030204" pitchFamily="49" charset="0"/>
                           <a:ea typeface="Cambria" panose="02040503050406030204" pitchFamily="18" charset="0"/>
                         </a:rPr>
                         <a:t>data$x7sqinv = 1/(data$x7)^2 </a:t>
                       </a:r>
-                      <a:endParaRPr lang="en-US" sz="1400" dirty="0">
+                      <a:endParaRPr lang="en-US" sz="1400" b="1" dirty="0">
                         <a:effectLst/>
                         <a:latin typeface="Times New Roman" panose="02020603050405020304" pitchFamily="18" charset="0"/>
                         <a:ea typeface="Times New Roman" panose="02020603050405020304" pitchFamily="18" charset="0"/>
@@ -42915,7 +43316,7 @@
                         </a:spcAft>
                       </a:pPr>
                       <a:r>
-                        <a:rPr lang="it-IT" sz="1400" dirty="0">
+                        <a:rPr lang="it-IT" sz="1400" b="1" dirty="0">
                           <a:effectLst/>
                           <a:latin typeface="Consolas" panose="020B0609020204030204" pitchFamily="49" charset="0"/>
                           <a:ea typeface="Cambria" panose="02040503050406030204" pitchFamily="18" charset="0"/>
@@ -42933,14 +43334,14 @@
                         </a:spcAft>
                       </a:pPr>
                       <a:r>
-                        <a:rPr lang="it-IT" sz="1400" dirty="0">
+                        <a:rPr lang="it-IT" sz="1400" b="1" dirty="0">
                           <a:effectLst/>
                           <a:latin typeface="Consolas" panose="020B0609020204030204" pitchFamily="49" charset="0"/>
                           <a:ea typeface="Cambria" panose="02040503050406030204" pitchFamily="18" charset="0"/>
                         </a:rPr>
                         <a:t>data$x1log = log(data$x1)</a:t>
                       </a:r>
-                      <a:endParaRPr lang="en-US" sz="1400" dirty="0">
+                      <a:endParaRPr lang="en-US" sz="1400" b="1" dirty="0">
                         <a:effectLst/>
                         <a:latin typeface="Times New Roman" panose="02020603050405020304" pitchFamily="18" charset="0"/>
                         <a:ea typeface="Times New Roman" panose="02020603050405020304" pitchFamily="18" charset="0"/>
@@ -42956,14 +43357,14 @@
                         </a:spcAft>
                       </a:pPr>
                       <a:r>
-                        <a:rPr lang="it-IT" sz="1400" dirty="0">
+                        <a:rPr lang="it-IT" sz="1400" b="1" dirty="0">
                           <a:effectLst/>
                           <a:latin typeface="Consolas" panose="020B0609020204030204" pitchFamily="49" charset="0"/>
                           <a:ea typeface="Cambria" panose="02040503050406030204" pitchFamily="18" charset="0"/>
                         </a:rPr>
                         <a:t>data$x20log = log(data$x20)</a:t>
                       </a:r>
-                      <a:endParaRPr lang="en-US" sz="1400" dirty="0">
+                      <a:endParaRPr lang="en-US" sz="1400" b="1" dirty="0">
                         <a:effectLst/>
                         <a:latin typeface="Times New Roman" panose="02020603050405020304" pitchFamily="18" charset="0"/>
                         <a:ea typeface="Times New Roman" panose="02020603050405020304" pitchFamily="18" charset="0"/>
@@ -42979,14 +43380,14 @@
                         </a:spcAft>
                       </a:pPr>
                       <a:r>
-                        <a:rPr lang="it-IT" sz="1400" dirty="0">
+                        <a:rPr lang="it-IT" sz="1400" b="1" dirty="0">
                           <a:effectLst/>
                           <a:latin typeface="Consolas" panose="020B0609020204030204" pitchFamily="49" charset="0"/>
                           <a:ea typeface="Cambria" panose="02040503050406030204" pitchFamily="18" charset="0"/>
                         </a:rPr>
                         <a:t>data$x21log = log(data$x21)</a:t>
                       </a:r>
-                      <a:endParaRPr lang="en-US" sz="1400" dirty="0">
+                      <a:endParaRPr lang="en-US" sz="1400" b="1" dirty="0">
                         <a:effectLst/>
                         <a:latin typeface="Times New Roman" panose="02020603050405020304" pitchFamily="18" charset="0"/>
                         <a:ea typeface="Times New Roman" panose="02020603050405020304" pitchFamily="18" charset="0"/>
@@ -43002,14 +43403,14 @@
                         </a:spcAft>
                       </a:pPr>
                       <a:r>
-                        <a:rPr lang="it-IT" sz="1400" dirty="0">
+                        <a:rPr lang="it-IT" sz="1400" b="1" dirty="0">
                           <a:effectLst/>
                           <a:latin typeface="Consolas" panose="020B0609020204030204" pitchFamily="49" charset="0"/>
                           <a:ea typeface="Cambria" panose="02040503050406030204" pitchFamily="18" charset="0"/>
                         </a:rPr>
                         <a:t>data$x22log = log(data$x22)</a:t>
                       </a:r>
-                      <a:endParaRPr lang="en-US" sz="1400" dirty="0">
+                      <a:endParaRPr lang="en-US" sz="1400" b="1" dirty="0">
                         <a:effectLst/>
                         <a:latin typeface="Times New Roman" panose="02020603050405020304" pitchFamily="18" charset="0"/>
                         <a:ea typeface="Times New Roman" panose="02020603050405020304" pitchFamily="18" charset="0"/>
@@ -43025,14 +43426,14 @@
                         </a:spcAft>
                       </a:pPr>
                       <a:r>
-                        <a:rPr lang="it-IT" sz="1400" dirty="0">
+                        <a:rPr lang="it-IT" sz="1400" b="1" dirty="0">
                           <a:effectLst/>
                           <a:latin typeface="Consolas" panose="020B0609020204030204" pitchFamily="49" charset="0"/>
                           <a:ea typeface="Cambria" panose="02040503050406030204" pitchFamily="18" charset="0"/>
                         </a:rPr>
                         <a:t>data$x23log = log(data$x23)</a:t>
                       </a:r>
-                      <a:endParaRPr lang="en-US" sz="1400" dirty="0">
+                      <a:endParaRPr lang="en-US" sz="1400" b="1" dirty="0">
                         <a:effectLst/>
                         <a:latin typeface="Times New Roman" panose="02020603050405020304" pitchFamily="18" charset="0"/>
                         <a:ea typeface="Times New Roman" panose="02020603050405020304" pitchFamily="18" charset="0"/>
@@ -43048,14 +43449,14 @@
                         </a:spcAft>
                       </a:pPr>
                       <a:r>
-                        <a:rPr lang="it-IT" sz="1400" dirty="0">
+                        <a:rPr lang="it-IT" sz="1400" b="1" dirty="0">
                           <a:effectLst/>
                           <a:latin typeface="Consolas" panose="020B0609020204030204" pitchFamily="49" charset="0"/>
                           <a:ea typeface="Cambria" panose="02040503050406030204" pitchFamily="18" charset="0"/>
                         </a:rPr>
                         <a:t>data$x11log = log(data$x11)</a:t>
                       </a:r>
-                      <a:endParaRPr lang="en-US" sz="1400" dirty="0">
+                      <a:endParaRPr lang="en-US" sz="1400" b="1" dirty="0">
                         <a:effectLst/>
                         <a:latin typeface="Times New Roman" panose="02020603050405020304" pitchFamily="18" charset="0"/>
                         <a:ea typeface="Times New Roman" panose="02020603050405020304" pitchFamily="18" charset="0"/>
@@ -43070,7 +43471,7 @@
                           <a:spcPts val="0"/>
                         </a:spcAft>
                       </a:pPr>
-                      <a:endParaRPr lang="en-US" sz="1000" dirty="0">
+                      <a:endParaRPr lang="en-US" sz="1000" b="1" dirty="0">
                         <a:effectLst/>
                         <a:latin typeface="Times New Roman" panose="02020603050405020304" pitchFamily="18" charset="0"/>
                         <a:ea typeface="Times New Roman" panose="02020603050405020304" pitchFamily="18" charset="0"/>
@@ -43167,7 +43568,7 @@
               </a:spcAft>
             </a:pPr>
             <a:r>
-              <a:rPr lang="en-US" sz="1400" dirty="0">
+              <a:rPr lang="en-US" sz="1400" b="1" dirty="0">
                 <a:latin typeface="Consolas" panose="020B0609020204030204" pitchFamily="49" charset="0"/>
                 <a:ea typeface="Cambria" panose="02040503050406030204" pitchFamily="18" charset="0"/>
                 <a:cs typeface="Times New Roman" panose="02020603050405020304" pitchFamily="18" charset="0"/>
@@ -43175,14 +43576,14 @@
               <a:t>##    Variables      VIF</a:t>
             </a:r>
             <a:br>
-              <a:rPr lang="en-US" sz="1400" dirty="0">
+              <a:rPr lang="en-US" sz="1400" b="1" dirty="0">
                 <a:latin typeface="Consolas" panose="020B0609020204030204" pitchFamily="49" charset="0"/>
                 <a:ea typeface="Cambria" panose="02040503050406030204" pitchFamily="18" charset="0"/>
                 <a:cs typeface="Times New Roman" panose="02020603050405020304" pitchFamily="18" charset="0"/>
               </a:rPr>
             </a:br>
             <a:r>
-              <a:rPr lang="en-US" sz="1400" dirty="0">
+              <a:rPr lang="en-US" sz="1400" b="1" dirty="0">
                 <a:latin typeface="Consolas" panose="020B0609020204030204" pitchFamily="49" charset="0"/>
                 <a:ea typeface="Cambria" panose="02040503050406030204" pitchFamily="18" charset="0"/>
                 <a:cs typeface="Times New Roman" panose="02020603050405020304" pitchFamily="18" charset="0"/>
@@ -43190,14 +43591,14 @@
               <a:t>## 1    stat204 1.063870</a:t>
             </a:r>
             <a:br>
-              <a:rPr lang="en-US" sz="1400" dirty="0">
+              <a:rPr lang="en-US" sz="1400" b="1" dirty="0">
                 <a:latin typeface="Consolas" panose="020B0609020204030204" pitchFamily="49" charset="0"/>
                 <a:ea typeface="Cambria" panose="02040503050406030204" pitchFamily="18" charset="0"/>
                 <a:cs typeface="Times New Roman" panose="02020603050405020304" pitchFamily="18" charset="0"/>
               </a:rPr>
             </a:br>
             <a:r>
-              <a:rPr lang="en-US" sz="1400" dirty="0">
+              <a:rPr lang="en-US" sz="1400" b="1" dirty="0">
                 <a:latin typeface="Consolas" panose="020B0609020204030204" pitchFamily="49" charset="0"/>
                 <a:ea typeface="Cambria" panose="02040503050406030204" pitchFamily="18" charset="0"/>
                 <a:cs typeface="Times New Roman" panose="02020603050405020304" pitchFamily="18" charset="0"/>
@@ -43205,14 +43606,14 @@
               <a:t>## 2    stat175 1.063370</a:t>
             </a:r>
             <a:br>
-              <a:rPr lang="en-US" sz="1400" dirty="0">
+              <a:rPr lang="en-US" sz="1400" b="1" dirty="0">
                 <a:latin typeface="Consolas" panose="020B0609020204030204" pitchFamily="49" charset="0"/>
                 <a:ea typeface="Cambria" panose="02040503050406030204" pitchFamily="18" charset="0"/>
                 <a:cs typeface="Times New Roman" panose="02020603050405020304" pitchFamily="18" charset="0"/>
               </a:rPr>
             </a:br>
             <a:r>
-              <a:rPr lang="en-US" sz="1400" dirty="0">
+              <a:rPr lang="en-US" sz="1400" b="1" dirty="0">
                 <a:latin typeface="Consolas" panose="020B0609020204030204" pitchFamily="49" charset="0"/>
                 <a:ea typeface="Cambria" panose="02040503050406030204" pitchFamily="18" charset="0"/>
                 <a:cs typeface="Times New Roman" panose="02020603050405020304" pitchFamily="18" charset="0"/>
@@ -43220,14 +43621,14 @@
               <a:t>## 3     stat66 1.062060</a:t>
             </a:r>
             <a:br>
-              <a:rPr lang="en-US" sz="1400" dirty="0">
+              <a:rPr lang="en-US" sz="1400" b="1" dirty="0">
                 <a:latin typeface="Consolas" panose="020B0609020204030204" pitchFamily="49" charset="0"/>
                 <a:ea typeface="Cambria" panose="02040503050406030204" pitchFamily="18" charset="0"/>
                 <a:cs typeface="Times New Roman" panose="02020603050405020304" pitchFamily="18" charset="0"/>
               </a:rPr>
             </a:br>
             <a:r>
-              <a:rPr lang="en-US" sz="1400" dirty="0">
+              <a:rPr lang="en-US" sz="1400" b="1" dirty="0">
                 <a:latin typeface="Consolas" panose="020B0609020204030204" pitchFamily="49" charset="0"/>
                 <a:ea typeface="Cambria" panose="02040503050406030204" pitchFamily="18" charset="0"/>
                 <a:cs typeface="Times New Roman" panose="02020603050405020304" pitchFamily="18" charset="0"/>
@@ -43235,14 +43636,14 @@
               <a:t>## 4    stat105 1.062008</a:t>
             </a:r>
             <a:br>
-              <a:rPr lang="en-US" sz="1400" dirty="0">
+              <a:rPr lang="en-US" sz="1400" b="1" dirty="0">
                 <a:latin typeface="Consolas" panose="020B0609020204030204" pitchFamily="49" charset="0"/>
                 <a:ea typeface="Cambria" panose="02040503050406030204" pitchFamily="18" charset="0"/>
                 <a:cs typeface="Times New Roman" panose="02020603050405020304" pitchFamily="18" charset="0"/>
               </a:rPr>
             </a:br>
             <a:r>
-              <a:rPr lang="en-US" sz="1400" dirty="0">
+              <a:rPr lang="en-US" sz="1400" b="1" dirty="0">
                 <a:latin typeface="Consolas" panose="020B0609020204030204" pitchFamily="49" charset="0"/>
                 <a:ea typeface="Cambria" panose="02040503050406030204" pitchFamily="18" charset="0"/>
                 <a:cs typeface="Times New Roman" panose="02020603050405020304" pitchFamily="18" charset="0"/>
@@ -43250,14 +43651,14 @@
               <a:t>## 5         x6 1.061394</a:t>
             </a:r>
             <a:br>
-              <a:rPr lang="en-US" sz="1400" dirty="0">
+              <a:rPr lang="en-US" sz="1400" b="1" dirty="0">
                 <a:latin typeface="Consolas" panose="020B0609020204030204" pitchFamily="49" charset="0"/>
                 <a:ea typeface="Cambria" panose="02040503050406030204" pitchFamily="18" charset="0"/>
                 <a:cs typeface="Times New Roman" panose="02020603050405020304" pitchFamily="18" charset="0"/>
               </a:rPr>
             </a:br>
             <a:r>
-              <a:rPr lang="en-US" sz="1400" dirty="0">
+              <a:rPr lang="en-US" sz="1400" b="1" dirty="0">
                 <a:latin typeface="Consolas" panose="020B0609020204030204" pitchFamily="49" charset="0"/>
                 <a:ea typeface="Cambria" panose="02040503050406030204" pitchFamily="18" charset="0"/>
                 <a:cs typeface="Times New Roman" panose="02020603050405020304" pitchFamily="18" charset="0"/>
@@ -43265,14 +43666,14 @@
               <a:t>## 6      stat2 1.061388</a:t>
             </a:r>
             <a:br>
-              <a:rPr lang="en-US" sz="1400" dirty="0">
+              <a:rPr lang="en-US" sz="1400" b="1" dirty="0">
                 <a:latin typeface="Consolas" panose="020B0609020204030204" pitchFamily="49" charset="0"/>
                 <a:ea typeface="Cambria" panose="02040503050406030204" pitchFamily="18" charset="0"/>
                 <a:cs typeface="Times New Roman" panose="02020603050405020304" pitchFamily="18" charset="0"/>
               </a:rPr>
             </a:br>
             <a:r>
-              <a:rPr lang="en-US" sz="1400" dirty="0">
+              <a:rPr lang="en-US" sz="1400" b="1" dirty="0">
                 <a:latin typeface="Consolas" panose="020B0609020204030204" pitchFamily="49" charset="0"/>
                 <a:ea typeface="Cambria" panose="02040503050406030204" pitchFamily="18" charset="0"/>
                 <a:cs typeface="Times New Roman" panose="02020603050405020304" pitchFamily="18" charset="0"/>
@@ -43280,14 +43681,14 @@
               <a:t>## 7     stat14 1.061212</a:t>
             </a:r>
             <a:br>
-              <a:rPr lang="en-US" sz="1400" dirty="0">
+              <a:rPr lang="en-US" sz="1400" b="1" dirty="0">
                 <a:latin typeface="Consolas" panose="020B0609020204030204" pitchFamily="49" charset="0"/>
                 <a:ea typeface="Cambria" panose="02040503050406030204" pitchFamily="18" charset="0"/>
                 <a:cs typeface="Times New Roman" panose="02020603050405020304" pitchFamily="18" charset="0"/>
               </a:rPr>
             </a:br>
             <a:r>
-              <a:rPr lang="en-US" sz="1400" dirty="0">
+              <a:rPr lang="en-US" sz="1400" b="1" dirty="0">
                 <a:latin typeface="Consolas" panose="020B0609020204030204" pitchFamily="49" charset="0"/>
                 <a:ea typeface="Cambria" panose="02040503050406030204" pitchFamily="18" charset="0"/>
                 <a:cs typeface="Times New Roman" panose="02020603050405020304" pitchFamily="18" charset="0"/>
@@ -43295,14 +43696,14 @@
               <a:t>## 8         x7 1.060532</a:t>
             </a:r>
             <a:br>
-              <a:rPr lang="en-US" sz="1400" dirty="0">
+              <a:rPr lang="en-US" sz="1400" b="1" dirty="0">
                 <a:latin typeface="Consolas" panose="020B0609020204030204" pitchFamily="49" charset="0"/>
                 <a:ea typeface="Cambria" panose="02040503050406030204" pitchFamily="18" charset="0"/>
                 <a:cs typeface="Times New Roman" panose="02020603050405020304" pitchFamily="18" charset="0"/>
               </a:rPr>
             </a:br>
             <a:r>
-              <a:rPr lang="en-US" sz="1400" dirty="0">
+              <a:rPr lang="en-US" sz="1400" b="1" dirty="0">
                 <a:latin typeface="Consolas" panose="020B0609020204030204" pitchFamily="49" charset="0"/>
                 <a:ea typeface="Cambria" panose="02040503050406030204" pitchFamily="18" charset="0"/>
                 <a:cs typeface="Times New Roman" panose="02020603050405020304" pitchFamily="18" charset="0"/>
@@ -43310,14 +43711,14 @@
               <a:t>## 9    stat216 1.060477</a:t>
             </a:r>
             <a:br>
-              <a:rPr lang="en-US" sz="1400" dirty="0">
+              <a:rPr lang="en-US" sz="1400" b="1" dirty="0">
                 <a:latin typeface="Consolas" panose="020B0609020204030204" pitchFamily="49" charset="0"/>
                 <a:ea typeface="Cambria" panose="02040503050406030204" pitchFamily="18" charset="0"/>
                 <a:cs typeface="Times New Roman" panose="02020603050405020304" pitchFamily="18" charset="0"/>
               </a:rPr>
             </a:br>
             <a:r>
-              <a:rPr lang="en-US" sz="1400" dirty="0">
+              <a:rPr lang="en-US" sz="1400" b="1" dirty="0">
                 <a:latin typeface="Consolas" panose="020B0609020204030204" pitchFamily="49" charset="0"/>
                 <a:ea typeface="Cambria" panose="02040503050406030204" pitchFamily="18" charset="0"/>
                 <a:cs typeface="Times New Roman" panose="02020603050405020304" pitchFamily="18" charset="0"/>
@@ -43325,14 +43726,14 @@
               <a:t>## 10   stat142 1.060190</a:t>
             </a:r>
             <a:br>
-              <a:rPr lang="en-US" sz="1400" dirty="0">
+              <a:rPr lang="en-US" sz="1400" b="1" dirty="0">
                 <a:latin typeface="Consolas" panose="020B0609020204030204" pitchFamily="49" charset="0"/>
                 <a:ea typeface="Cambria" panose="02040503050406030204" pitchFamily="18" charset="0"/>
                 <a:cs typeface="Times New Roman" panose="02020603050405020304" pitchFamily="18" charset="0"/>
               </a:rPr>
             </a:br>
             <a:r>
-              <a:rPr lang="en-US" sz="1400" dirty="0">
+              <a:rPr lang="en-US" sz="1400" b="1" dirty="0">
                 <a:latin typeface="Consolas" panose="020B0609020204030204" pitchFamily="49" charset="0"/>
                 <a:ea typeface="Cambria" panose="02040503050406030204" pitchFamily="18" charset="0"/>
                 <a:cs typeface="Times New Roman" panose="02020603050405020304" pitchFamily="18" charset="0"/>
@@ -43340,14 +43741,14 @@
               <a:t>## 11   stat154 1.059695</a:t>
             </a:r>
             <a:br>
-              <a:rPr lang="en-US" sz="1400" dirty="0">
+              <a:rPr lang="en-US" sz="1400" b="1" dirty="0">
                 <a:latin typeface="Consolas" panose="020B0609020204030204" pitchFamily="49" charset="0"/>
                 <a:ea typeface="Cambria" panose="02040503050406030204" pitchFamily="18" charset="0"/>
                 <a:cs typeface="Times New Roman" panose="02020603050405020304" pitchFamily="18" charset="0"/>
               </a:rPr>
             </a:br>
             <a:r>
-              <a:rPr lang="en-US" sz="1400" dirty="0">
+              <a:rPr lang="en-US" sz="1400" b="1" dirty="0">
                 <a:latin typeface="Consolas" panose="020B0609020204030204" pitchFamily="49" charset="0"/>
                 <a:ea typeface="Cambria" panose="02040503050406030204" pitchFamily="18" charset="0"/>
                 <a:cs typeface="Times New Roman" panose="02020603050405020304" pitchFamily="18" charset="0"/>
@@ -43355,14 +43756,14 @@
               <a:t>## 12    stat32 1.059608</a:t>
             </a:r>
             <a:br>
-              <a:rPr lang="en-US" sz="1400" dirty="0">
+              <a:rPr lang="en-US" sz="1400" b="1" dirty="0">
                 <a:latin typeface="Consolas" panose="020B0609020204030204" pitchFamily="49" charset="0"/>
                 <a:ea typeface="Cambria" panose="02040503050406030204" pitchFamily="18" charset="0"/>
                 <a:cs typeface="Times New Roman" panose="02020603050405020304" pitchFamily="18" charset="0"/>
               </a:rPr>
             </a:br>
             <a:r>
-              <a:rPr lang="en-US" sz="1400" dirty="0">
+              <a:rPr lang="en-US" sz="1400" b="1" dirty="0">
                 <a:latin typeface="Consolas" panose="020B0609020204030204" pitchFamily="49" charset="0"/>
                 <a:ea typeface="Cambria" panose="02040503050406030204" pitchFamily="18" charset="0"/>
                 <a:cs typeface="Times New Roman" panose="02020603050405020304" pitchFamily="18" charset="0"/>
@@ -43370,14 +43771,14 @@
               <a:t>## 13   stat141 1.059564</a:t>
             </a:r>
             <a:br>
-              <a:rPr lang="en-US" sz="1400" dirty="0">
+              <a:rPr lang="en-US" sz="1400" b="1" dirty="0">
                 <a:latin typeface="Consolas" panose="020B0609020204030204" pitchFamily="49" charset="0"/>
                 <a:ea typeface="Cambria" panose="02040503050406030204" pitchFamily="18" charset="0"/>
                 <a:cs typeface="Times New Roman" panose="02020603050405020304" pitchFamily="18" charset="0"/>
               </a:rPr>
             </a:br>
             <a:r>
-              <a:rPr lang="en-US" sz="1400" dirty="0">
+              <a:rPr lang="en-US" sz="1400" b="1" dirty="0">
                 <a:latin typeface="Consolas" panose="020B0609020204030204" pitchFamily="49" charset="0"/>
                 <a:ea typeface="Cambria" panose="02040503050406030204" pitchFamily="18" charset="0"/>
                 <a:cs typeface="Times New Roman" panose="02020603050405020304" pitchFamily="18" charset="0"/>
@@ -43385,21 +43786,21 @@
               <a:t>## 14   stat138 1.059507</a:t>
             </a:r>
             <a:br>
-              <a:rPr lang="en-US" sz="1400" dirty="0">
+              <a:rPr lang="en-US" sz="1400" b="1" dirty="0">
                 <a:latin typeface="Consolas" panose="020B0609020204030204" pitchFamily="49" charset="0"/>
                 <a:ea typeface="Cambria" panose="02040503050406030204" pitchFamily="18" charset="0"/>
                 <a:cs typeface="Times New Roman" panose="02020603050405020304" pitchFamily="18" charset="0"/>
               </a:rPr>
             </a:br>
             <a:r>
-              <a:rPr lang="en-US" sz="1400" dirty="0">
+              <a:rPr lang="en-US" sz="1400" b="1" dirty="0">
                 <a:latin typeface="Consolas" panose="020B0609020204030204" pitchFamily="49" charset="0"/>
                 <a:ea typeface="Cambria" panose="02040503050406030204" pitchFamily="18" charset="0"/>
                 <a:cs typeface="Times New Roman" panose="02020603050405020304" pitchFamily="18" charset="0"/>
               </a:rPr>
               <a:t>## 15    stat73 1.059386</a:t>
             </a:r>
-            <a:endParaRPr lang="en-US" sz="1400" dirty="0">
+            <a:endParaRPr lang="en-US" sz="1400" b="1" dirty="0">
               <a:effectLst/>
               <a:latin typeface="Consolas" panose="020B0609020204030204" pitchFamily="49" charset="0"/>
               <a:ea typeface="Cambria" panose="02040503050406030204" pitchFamily="18" charset="0"/>
@@ -43495,7 +43896,7 @@
         </p:spPr>
         <p:txBody>
           <a:bodyPr>
-            <a:normAutofit/>
+            <a:normAutofit lnSpcReduction="10000"/>
           </a:bodyPr>
           <a:lstStyle/>
           <a:p>
@@ -43534,7 +43935,7 @@
                 <a:latin typeface="Arial" panose="020B0604020202020204" pitchFamily="34" charset="0"/>
                 <a:cs typeface="Arial" panose="020B0604020202020204" pitchFamily="34" charset="0"/>
               </a:rPr>
-              <a:t>However,  did not improve the model fit  </a:t>
+              <a:t>However,  did not improve the model fit  compared to the best model from project 1.</a:t>
             </a:r>
           </a:p>
         </p:txBody>
@@ -43568,7 +43969,7 @@
         </p:blipFill>
         <p:spPr bwMode="auto">
           <a:xfrm>
-            <a:off x="11314048" y="815749"/>
+            <a:off x="11314048" y="307750"/>
             <a:ext cx="5646891" cy="4046659"/>
           </a:xfrm>
           <a:prstGeom prst="rect">
@@ -43615,7 +44016,7 @@
         </p:blipFill>
         <p:spPr bwMode="auto">
           <a:xfrm>
-            <a:off x="11331519" y="5301352"/>
+            <a:off x="11331519" y="5373922"/>
             <a:ext cx="5629421" cy="3924278"/>
           </a:xfrm>
           <a:prstGeom prst="rect">
@@ -43647,7 +44048,7 @@
         </p:nvSpPr>
         <p:spPr>
           <a:xfrm>
-            <a:off x="11314048" y="4858576"/>
+            <a:off x="11314048" y="4350577"/>
             <a:ext cx="5646891" cy="369332"/>
           </a:xfrm>
           <a:prstGeom prst="rect">
@@ -43692,7 +44093,7 @@
         </p:nvSpPr>
         <p:spPr>
           <a:xfrm>
-            <a:off x="11331518" y="9335456"/>
+            <a:off x="11331518" y="9408026"/>
             <a:ext cx="5629421" cy="646331"/>
           </a:xfrm>
           <a:prstGeom prst="rect">
@@ -43735,13 +44136,13 @@
           <p:nvPr>
             <p:extLst>
               <p:ext uri="{D42A27DB-BD31-4B8C-83A1-F6EECF244321}">
-                <p14:modId xmlns:p14="http://schemas.microsoft.com/office/powerpoint/2010/main" val="3573568151"/>
+                <p14:modId xmlns:p14="http://schemas.microsoft.com/office/powerpoint/2010/main" val="1208586523"/>
               </p:ext>
             </p:extLst>
           </p:nvPr>
         </p:nvGraphicFramePr>
         <p:xfrm>
-          <a:off x="2264229" y="6040758"/>
+          <a:off x="2278743" y="6527034"/>
           <a:ext cx="7779657" cy="1222008"/>
         </p:xfrm>
         <a:graphic>
@@ -44364,7 +44765,7 @@
                     <a:p>
                       <a:pPr algn="ctr" rtl="0" fontAlgn="base"/>
                       <a:r>
-                        <a:rPr lang="en-US" sz="1800" b="0" i="0" cap="small">
+                        <a:rPr lang="en-US" sz="1800" b="0" i="0" cap="small" dirty="0">
                           <a:solidFill>
                             <a:srgbClr val="FFFF00"/>
                           </a:solidFill>

</xml_diff>